<commit_message>
What is webpage & website
</commit_message>
<xml_diff>
--- a/Web Design Course/responsive-web-design-with-bootstrap.pptx
+++ b/Web Design Course/responsive-web-design-with-bootstrap.pptx
@@ -5895,6 +5895,48 @@
           </a:bodyPr>
           <a:lstStyle/>
           <a:p>
+            <a:r>
+              <a:rPr lang="en-US" sz="11500" b="1" dirty="0" err="1">
+                <a:solidFill>
+                  <a:schemeClr val="tx1">
+                    <a:lumMod val="85000"/>
+                    <a:lumOff val="15000"/>
+                  </a:schemeClr>
+                </a:solidFill>
+                <a:latin typeface="Kalpurush" panose="02000600000000000000" pitchFamily="2" charset="0"/>
+                <a:ea typeface="Yu Gothic Light" panose="020B0300000000000000" pitchFamily="34" charset="-128"/>
+                <a:cs typeface="Kalpurush" panose="02000600000000000000" pitchFamily="2" charset="0"/>
+              </a:rPr>
+              <a:t>ওয়েব</a:t>
+            </a:r>
+            <a:r>
+              <a:rPr lang="en-US" sz="11500" b="1" dirty="0">
+                <a:solidFill>
+                  <a:schemeClr val="tx1">
+                    <a:lumMod val="85000"/>
+                    <a:lumOff val="15000"/>
+                  </a:schemeClr>
+                </a:solidFill>
+                <a:latin typeface="Kalpurush" panose="02000600000000000000" pitchFamily="2" charset="0"/>
+                <a:ea typeface="Yu Gothic Light" panose="020B0300000000000000" pitchFamily="34" charset="-128"/>
+                <a:cs typeface="Kalpurush" panose="02000600000000000000" pitchFamily="2" charset="0"/>
+              </a:rPr>
+              <a:t> </a:t>
+            </a:r>
+            <a:r>
+              <a:rPr lang="en-US" sz="11500" b="1" dirty="0" err="1">
+                <a:solidFill>
+                  <a:schemeClr val="tx1">
+                    <a:lumMod val="85000"/>
+                    <a:lumOff val="15000"/>
+                  </a:schemeClr>
+                </a:solidFill>
+                <a:latin typeface="Kalpurush" panose="02000600000000000000" pitchFamily="2" charset="0"/>
+                <a:ea typeface="Yu Gothic Light" panose="020B0300000000000000" pitchFamily="34" charset="-128"/>
+                <a:cs typeface="Kalpurush" panose="02000600000000000000" pitchFamily="2" charset="0"/>
+              </a:rPr>
+              <a:t>ডিজাইন</a:t>
+            </a:r>
             <a:endParaRPr lang="en-US" sz="11500" b="1" dirty="0">
               <a:solidFill>
                 <a:schemeClr val="tx1">
@@ -13943,7 +13985,7 @@
         <p:spPr>
           <a:xfrm>
             <a:off x="328386" y="392031"/>
-            <a:ext cx="2698175" cy="523220"/>
+            <a:ext cx="4272323" cy="523220"/>
           </a:xfrm>
           <a:prstGeom prst="rect">
             <a:avLst/>
@@ -13957,7 +13999,7 @@
           <a:lstStyle/>
           <a:p>
             <a:r>
-              <a:rPr lang="en-US" sz="2800" b="1">
+              <a:rPr lang="en-US" sz="2800" b="1" dirty="0" err="1">
                 <a:solidFill>
                   <a:schemeClr val="tx1">
                     <a:lumMod val="85000"/>
@@ -13967,7 +14009,98 @@
                 <a:latin typeface="Kalpurush" panose="02000600000000000000" pitchFamily="2" charset="0"/>
                 <a:cs typeface="Kalpurush" panose="02000600000000000000" pitchFamily="2" charset="0"/>
               </a:rPr>
-              <a:t>হার্ডওয়্যার পরিচিতি </a:t>
+              <a:t>ওয়েবসাইট</a:t>
+            </a:r>
+            <a:r>
+              <a:rPr lang="en-US" sz="2800" b="1" dirty="0">
+                <a:solidFill>
+                  <a:schemeClr val="tx1">
+                    <a:lumMod val="85000"/>
+                    <a:lumOff val="15000"/>
+                  </a:schemeClr>
+                </a:solidFill>
+                <a:latin typeface="Kalpurush" panose="02000600000000000000" pitchFamily="2" charset="0"/>
+                <a:cs typeface="Kalpurush" panose="02000600000000000000" pitchFamily="2" charset="0"/>
+              </a:rPr>
+              <a:t> </a:t>
+            </a:r>
+            <a:r>
+              <a:rPr lang="en-US" sz="2800" b="1" dirty="0" err="1">
+                <a:solidFill>
+                  <a:schemeClr val="tx1">
+                    <a:lumMod val="85000"/>
+                    <a:lumOff val="15000"/>
+                  </a:schemeClr>
+                </a:solidFill>
+                <a:latin typeface="Kalpurush" panose="02000600000000000000" pitchFamily="2" charset="0"/>
+                <a:cs typeface="Kalpurush" panose="02000600000000000000" pitchFamily="2" charset="0"/>
+              </a:rPr>
+              <a:t>এবং</a:t>
+            </a:r>
+            <a:r>
+              <a:rPr lang="en-US" sz="2800" b="1" dirty="0">
+                <a:solidFill>
+                  <a:schemeClr val="tx1">
+                    <a:lumMod val="85000"/>
+                    <a:lumOff val="15000"/>
+                  </a:schemeClr>
+                </a:solidFill>
+                <a:latin typeface="Kalpurush" panose="02000600000000000000" pitchFamily="2" charset="0"/>
+                <a:cs typeface="Kalpurush" panose="02000600000000000000" pitchFamily="2" charset="0"/>
+              </a:rPr>
+              <a:t> </a:t>
+            </a:r>
+            <a:r>
+              <a:rPr lang="en-US" sz="2800" b="1" dirty="0" err="1">
+                <a:solidFill>
+                  <a:schemeClr val="tx1">
+                    <a:lumMod val="85000"/>
+                    <a:lumOff val="15000"/>
+                  </a:schemeClr>
+                </a:solidFill>
+                <a:latin typeface="Kalpurush" panose="02000600000000000000" pitchFamily="2" charset="0"/>
+                <a:cs typeface="Kalpurush" panose="02000600000000000000" pitchFamily="2" charset="0"/>
+              </a:rPr>
+              <a:t>ওয়েবপেজ</a:t>
+            </a:r>
+            <a:r>
+              <a:rPr lang="en-US" sz="2800" b="1" dirty="0">
+                <a:solidFill>
+                  <a:schemeClr val="tx1">
+                    <a:lumMod val="85000"/>
+                    <a:lumOff val="15000"/>
+                  </a:schemeClr>
+                </a:solidFill>
+                <a:latin typeface="Kalpurush" panose="02000600000000000000" pitchFamily="2" charset="0"/>
+                <a:cs typeface="Kalpurush" panose="02000600000000000000" pitchFamily="2" charset="0"/>
+              </a:rPr>
+              <a:t> </a:t>
+            </a:r>
+            <a:r>
+              <a:rPr lang="en-US" sz="2800" b="1" dirty="0" err="1">
+                <a:solidFill>
+                  <a:schemeClr val="tx1">
+                    <a:lumMod val="85000"/>
+                    <a:lumOff val="15000"/>
+                  </a:schemeClr>
+                </a:solidFill>
+                <a:latin typeface="Kalpurush" panose="02000600000000000000" pitchFamily="2" charset="0"/>
+                <a:cs typeface="Kalpurush" panose="02000600000000000000" pitchFamily="2" charset="0"/>
+              </a:rPr>
+              <a:t>কী</a:t>
+            </a:r>
+            <a:r>
+              <a:rPr lang="en-US" sz="2800" b="1" dirty="0">
+                <a:solidFill>
+                  <a:schemeClr val="tx1">
+                    <a:lumMod val="85000"/>
+                    <a:lumOff val="15000"/>
+                  </a:schemeClr>
+                </a:solidFill>
+                <a:latin typeface="Kalpurush" panose="02000600000000000000" pitchFamily="2" charset="0"/>
+                <a:cs typeface="Kalpurush" panose="02000600000000000000" pitchFamily="2" charset="0"/>
+              </a:rPr>
+              <a:t>?</a:t>
             </a:r>
           </a:p>
         </p:txBody>

</xml_diff>